<commit_message>
grinding on teleport things
</commit_message>
<xml_diff>
--- a/ILM_WS202223/Diagramme/Submit_Near/20230227_M5_MA_Teleport-Positionen.pptx
+++ b/ILM_WS202223/Diagramme/Submit_Near/20230227_M5_MA_Teleport-Positionen.pptx
@@ -8,7 +8,8 @@
     <p:sldId id="256" r:id="rId2"/>
     <p:sldId id="257" r:id="rId3"/>
     <p:sldId id="258" r:id="rId4"/>
-    <p:sldId id="259" r:id="rId5"/>
+    <p:sldId id="260" r:id="rId5"/>
+    <p:sldId id="259" r:id="rId6"/>
   </p:sldIdLst>
   <p:sldSz cx="12192000" cy="6858000"/>
   <p:notesSz cx="6858000" cy="9144000"/>
@@ -262,7 +263,7 @@
           <a:p>
             <a:fld id="{D3D81C79-391E-4044-A6C1-2932ABAEBDA0}" type="datetimeFigureOut">
               <a:rPr lang="de-DE" smtClean="0"/>
-              <a:t>01.03.2023</a:t>
+              <a:t>16.03.2023</a:t>
             </a:fld>
             <a:endParaRPr lang="de-DE"/>
           </a:p>
@@ -460,7 +461,7 @@
           <a:p>
             <a:fld id="{D3D81C79-391E-4044-A6C1-2932ABAEBDA0}" type="datetimeFigureOut">
               <a:rPr lang="de-DE" smtClean="0"/>
-              <a:t>01.03.2023</a:t>
+              <a:t>16.03.2023</a:t>
             </a:fld>
             <a:endParaRPr lang="de-DE"/>
           </a:p>
@@ -668,7 +669,7 @@
           <a:p>
             <a:fld id="{D3D81C79-391E-4044-A6C1-2932ABAEBDA0}" type="datetimeFigureOut">
               <a:rPr lang="de-DE" smtClean="0"/>
-              <a:t>01.03.2023</a:t>
+              <a:t>16.03.2023</a:t>
             </a:fld>
             <a:endParaRPr lang="de-DE"/>
           </a:p>
@@ -866,7 +867,7 @@
           <a:p>
             <a:fld id="{D3D81C79-391E-4044-A6C1-2932ABAEBDA0}" type="datetimeFigureOut">
               <a:rPr lang="de-DE" smtClean="0"/>
-              <a:t>01.03.2023</a:t>
+              <a:t>16.03.2023</a:t>
             </a:fld>
             <a:endParaRPr lang="de-DE"/>
           </a:p>
@@ -1141,7 +1142,7 @@
           <a:p>
             <a:fld id="{D3D81C79-391E-4044-A6C1-2932ABAEBDA0}" type="datetimeFigureOut">
               <a:rPr lang="de-DE" smtClean="0"/>
-              <a:t>01.03.2023</a:t>
+              <a:t>16.03.2023</a:t>
             </a:fld>
             <a:endParaRPr lang="de-DE"/>
           </a:p>
@@ -1406,7 +1407,7 @@
           <a:p>
             <a:fld id="{D3D81C79-391E-4044-A6C1-2932ABAEBDA0}" type="datetimeFigureOut">
               <a:rPr lang="de-DE" smtClean="0"/>
-              <a:t>01.03.2023</a:t>
+              <a:t>16.03.2023</a:t>
             </a:fld>
             <a:endParaRPr lang="de-DE"/>
           </a:p>
@@ -1818,7 +1819,7 @@
           <a:p>
             <a:fld id="{D3D81C79-391E-4044-A6C1-2932ABAEBDA0}" type="datetimeFigureOut">
               <a:rPr lang="de-DE" smtClean="0"/>
-              <a:t>01.03.2023</a:t>
+              <a:t>16.03.2023</a:t>
             </a:fld>
             <a:endParaRPr lang="de-DE"/>
           </a:p>
@@ -1959,7 +1960,7 @@
           <a:p>
             <a:fld id="{D3D81C79-391E-4044-A6C1-2932ABAEBDA0}" type="datetimeFigureOut">
               <a:rPr lang="de-DE" smtClean="0"/>
-              <a:t>01.03.2023</a:t>
+              <a:t>16.03.2023</a:t>
             </a:fld>
             <a:endParaRPr lang="de-DE"/>
           </a:p>
@@ -2072,7 +2073,7 @@
           <a:p>
             <a:fld id="{D3D81C79-391E-4044-A6C1-2932ABAEBDA0}" type="datetimeFigureOut">
               <a:rPr lang="de-DE" smtClean="0"/>
-              <a:t>01.03.2023</a:t>
+              <a:t>16.03.2023</a:t>
             </a:fld>
             <a:endParaRPr lang="de-DE"/>
           </a:p>
@@ -2383,7 +2384,7 @@
           <a:p>
             <a:fld id="{D3D81C79-391E-4044-A6C1-2932ABAEBDA0}" type="datetimeFigureOut">
               <a:rPr lang="de-DE" smtClean="0"/>
-              <a:t>01.03.2023</a:t>
+              <a:t>16.03.2023</a:t>
             </a:fld>
             <a:endParaRPr lang="de-DE"/>
           </a:p>
@@ -2671,7 +2672,7 @@
           <a:p>
             <a:fld id="{D3D81C79-391E-4044-A6C1-2932ABAEBDA0}" type="datetimeFigureOut">
               <a:rPr lang="de-DE" smtClean="0"/>
-              <a:t>01.03.2023</a:t>
+              <a:t>16.03.2023</a:t>
             </a:fld>
             <a:endParaRPr lang="de-DE"/>
           </a:p>
@@ -2912,7 +2913,7 @@
           <a:p>
             <a:fld id="{D3D81C79-391E-4044-A6C1-2932ABAEBDA0}" type="datetimeFigureOut">
               <a:rPr lang="de-DE" smtClean="0"/>
-              <a:t>01.03.2023</a:t>
+              <a:t>16.03.2023</a:t>
             </a:fld>
             <a:endParaRPr lang="de-DE"/>
           </a:p>
@@ -4411,6 +4412,497 @@
       </p:grpSpPr>
       <p:pic>
         <p:nvPicPr>
+          <p:cNvPr id="13" name="Grafik 12" descr="Ein Bild, das Diagramm enthält.&#10;&#10;Automatisch generierte Beschreibung">
+            <a:extLst>
+              <a:ext uri="{FF2B5EF4-FFF2-40B4-BE49-F238E27FC236}">
+                <a16:creationId xmlns:a16="http://schemas.microsoft.com/office/drawing/2014/main" id="{C5B2678B-E44F-A50A-77F5-546B22F27CF0}"/>
+              </a:ext>
+            </a:extLst>
+          </p:cNvPr>
+          <p:cNvPicPr>
+            <a:picLocks noChangeAspect="1"/>
+          </p:cNvPicPr>
+          <p:nvPr/>
+        </p:nvPicPr>
+        <p:blipFill>
+          <a:blip r:embed="rId2">
+            <a:extLst>
+              <a:ext uri="{28A0092B-C50C-407E-A947-70E740481C1C}">
+                <a14:useLocalDpi xmlns:a14="http://schemas.microsoft.com/office/drawing/2010/main" val="0"/>
+              </a:ext>
+            </a:extLst>
+          </a:blip>
+          <a:stretch>
+            <a:fillRect/>
+          </a:stretch>
+        </p:blipFill>
+        <p:spPr>
+          <a:xfrm>
+            <a:off x="127555" y="393792"/>
+            <a:ext cx="11705334" cy="5806943"/>
+          </a:xfrm>
+          <a:prstGeom prst="rect">
+            <a:avLst/>
+          </a:prstGeom>
+        </p:spPr>
+      </p:pic>
+      <p:pic>
+        <p:nvPicPr>
+          <p:cNvPr id="15" name="Grafik 14" descr="Ein Bild, das Diagramm enthält.&#10;&#10;Automatisch generierte Beschreibung">
+            <a:extLst>
+              <a:ext uri="{FF2B5EF4-FFF2-40B4-BE49-F238E27FC236}">
+                <a16:creationId xmlns:a16="http://schemas.microsoft.com/office/drawing/2014/main" id="{949BDFAA-5EC4-2742-8C67-104986E110C6}"/>
+              </a:ext>
+            </a:extLst>
+          </p:cNvPr>
+          <p:cNvPicPr>
+            <a:picLocks noChangeAspect="1"/>
+          </p:cNvPicPr>
+          <p:nvPr/>
+        </p:nvPicPr>
+        <p:blipFill rotWithShape="1">
+          <a:blip r:embed="rId3">
+            <a:extLst>
+              <a:ext uri="{28A0092B-C50C-407E-A947-70E740481C1C}">
+                <a14:useLocalDpi xmlns:a14="http://schemas.microsoft.com/office/drawing/2010/main" val="0"/>
+              </a:ext>
+            </a:extLst>
+          </a:blip>
+          <a:srcRect l="84455" r="6090"/>
+          <a:stretch/>
+        </p:blipFill>
+        <p:spPr>
+          <a:xfrm>
+            <a:off x="10994034" y="354259"/>
+            <a:ext cx="1114271" cy="5846476"/>
+          </a:xfrm>
+          <a:prstGeom prst="rect">
+            <a:avLst/>
+          </a:prstGeom>
+        </p:spPr>
+      </p:pic>
+      <p:sp>
+        <p:nvSpPr>
+          <p:cNvPr id="18" name="Textfeld 17">
+            <a:extLst>
+              <a:ext uri="{FF2B5EF4-FFF2-40B4-BE49-F238E27FC236}">
+                <a16:creationId xmlns:a16="http://schemas.microsoft.com/office/drawing/2014/main" id="{D398E471-5782-E89B-C53D-565918D3F74F}"/>
+              </a:ext>
+            </a:extLst>
+          </p:cNvPr>
+          <p:cNvSpPr txBox="1"/>
+          <p:nvPr/>
+        </p:nvSpPr>
+        <p:spPr>
+          <a:xfrm>
+            <a:off x="4915689" y="3786153"/>
+            <a:ext cx="267788" cy="461665"/>
+          </a:xfrm>
+          <a:prstGeom prst="rect">
+            <a:avLst/>
+          </a:prstGeom>
+          <a:noFill/>
+        </p:spPr>
+        <p:txBody>
+          <a:bodyPr wrap="square" rtlCol="0">
+            <a:spAutoFit/>
+          </a:bodyPr>
+          <a:lstStyle/>
+          <a:p>
+            <a:r>
+              <a:rPr lang="de-DE" sz="2400" b="1" dirty="0">
+                <a:solidFill>
+                  <a:schemeClr val="bg1"/>
+                </a:solidFill>
+              </a:rPr>
+              <a:t>1</a:t>
+            </a:r>
+          </a:p>
+        </p:txBody>
+      </p:sp>
+      <p:sp>
+        <p:nvSpPr>
+          <p:cNvPr id="19" name="Textfeld 18">
+            <a:extLst>
+              <a:ext uri="{FF2B5EF4-FFF2-40B4-BE49-F238E27FC236}">
+                <a16:creationId xmlns:a16="http://schemas.microsoft.com/office/drawing/2014/main" id="{0234C39C-4673-DD10-E1F5-B548E94BD148}"/>
+              </a:ext>
+            </a:extLst>
+          </p:cNvPr>
+          <p:cNvSpPr txBox="1"/>
+          <p:nvPr/>
+        </p:nvSpPr>
+        <p:spPr>
+          <a:xfrm>
+            <a:off x="2425905" y="3324488"/>
+            <a:ext cx="267788" cy="461665"/>
+          </a:xfrm>
+          <a:prstGeom prst="rect">
+            <a:avLst/>
+          </a:prstGeom>
+          <a:noFill/>
+        </p:spPr>
+        <p:txBody>
+          <a:bodyPr wrap="square" rtlCol="0">
+            <a:spAutoFit/>
+          </a:bodyPr>
+          <a:lstStyle/>
+          <a:p>
+            <a:r>
+              <a:rPr lang="de-DE" sz="2400" b="1" dirty="0">
+                <a:solidFill>
+                  <a:schemeClr val="bg1"/>
+                </a:solidFill>
+              </a:rPr>
+              <a:t>2</a:t>
+            </a:r>
+          </a:p>
+        </p:txBody>
+      </p:sp>
+      <p:sp>
+        <p:nvSpPr>
+          <p:cNvPr id="20" name="Textfeld 19">
+            <a:extLst>
+              <a:ext uri="{FF2B5EF4-FFF2-40B4-BE49-F238E27FC236}">
+                <a16:creationId xmlns:a16="http://schemas.microsoft.com/office/drawing/2014/main" id="{6B6752DF-E201-6B0C-4DB4-F6AFF0CD726B}"/>
+              </a:ext>
+            </a:extLst>
+          </p:cNvPr>
+          <p:cNvSpPr txBox="1"/>
+          <p:nvPr/>
+        </p:nvSpPr>
+        <p:spPr>
+          <a:xfrm>
+            <a:off x="4528793" y="2431613"/>
+            <a:ext cx="267788" cy="461665"/>
+          </a:xfrm>
+          <a:prstGeom prst="rect">
+            <a:avLst/>
+          </a:prstGeom>
+          <a:noFill/>
+        </p:spPr>
+        <p:txBody>
+          <a:bodyPr wrap="square" rtlCol="0">
+            <a:spAutoFit/>
+          </a:bodyPr>
+          <a:lstStyle/>
+          <a:p>
+            <a:r>
+              <a:rPr lang="de-DE" sz="2400" b="1" dirty="0">
+                <a:solidFill>
+                  <a:schemeClr val="bg1"/>
+                </a:solidFill>
+              </a:rPr>
+              <a:t>3</a:t>
+            </a:r>
+          </a:p>
+        </p:txBody>
+      </p:sp>
+      <p:sp>
+        <p:nvSpPr>
+          <p:cNvPr id="21" name="Textfeld 20">
+            <a:extLst>
+              <a:ext uri="{FF2B5EF4-FFF2-40B4-BE49-F238E27FC236}">
+                <a16:creationId xmlns:a16="http://schemas.microsoft.com/office/drawing/2014/main" id="{5803063F-DBC0-5317-02EE-841166FD9FB6}"/>
+              </a:ext>
+            </a:extLst>
+          </p:cNvPr>
+          <p:cNvSpPr txBox="1"/>
+          <p:nvPr/>
+        </p:nvSpPr>
+        <p:spPr>
+          <a:xfrm>
+            <a:off x="4106556" y="1542130"/>
+            <a:ext cx="267788" cy="461665"/>
+          </a:xfrm>
+          <a:prstGeom prst="rect">
+            <a:avLst/>
+          </a:prstGeom>
+          <a:noFill/>
+        </p:spPr>
+        <p:txBody>
+          <a:bodyPr wrap="square" rtlCol="0">
+            <a:spAutoFit/>
+          </a:bodyPr>
+          <a:lstStyle/>
+          <a:p>
+            <a:r>
+              <a:rPr lang="de-DE" sz="2400" b="1" dirty="0">
+                <a:solidFill>
+                  <a:schemeClr val="bg1"/>
+                </a:solidFill>
+              </a:rPr>
+              <a:t>4</a:t>
+            </a:r>
+          </a:p>
+        </p:txBody>
+      </p:sp>
+      <p:sp>
+        <p:nvSpPr>
+          <p:cNvPr id="22" name="Textfeld 21">
+            <a:extLst>
+              <a:ext uri="{FF2B5EF4-FFF2-40B4-BE49-F238E27FC236}">
+                <a16:creationId xmlns:a16="http://schemas.microsoft.com/office/drawing/2014/main" id="{BA541925-5707-F290-52A5-6ABD8431FF86}"/>
+              </a:ext>
+            </a:extLst>
+          </p:cNvPr>
+          <p:cNvSpPr txBox="1"/>
+          <p:nvPr/>
+        </p:nvSpPr>
+        <p:spPr>
+          <a:xfrm>
+            <a:off x="1618547" y="1080465"/>
+            <a:ext cx="324338" cy="461665"/>
+          </a:xfrm>
+          <a:prstGeom prst="rect">
+            <a:avLst/>
+          </a:prstGeom>
+          <a:noFill/>
+        </p:spPr>
+        <p:txBody>
+          <a:bodyPr wrap="square" rtlCol="0">
+            <a:spAutoFit/>
+          </a:bodyPr>
+          <a:lstStyle/>
+          <a:p>
+            <a:r>
+              <a:rPr lang="de-DE" sz="2400" b="1" dirty="0">
+                <a:solidFill>
+                  <a:schemeClr val="bg1"/>
+                </a:solidFill>
+              </a:rPr>
+              <a:t>5</a:t>
+            </a:r>
+          </a:p>
+        </p:txBody>
+      </p:sp>
+      <p:sp>
+        <p:nvSpPr>
+          <p:cNvPr id="23" name="Textfeld 22">
+            <a:extLst>
+              <a:ext uri="{FF2B5EF4-FFF2-40B4-BE49-F238E27FC236}">
+                <a16:creationId xmlns:a16="http://schemas.microsoft.com/office/drawing/2014/main" id="{771A8759-B22B-AA6D-205E-B05C304BE668}"/>
+              </a:ext>
+            </a:extLst>
+          </p:cNvPr>
+          <p:cNvSpPr txBox="1"/>
+          <p:nvPr/>
+        </p:nvSpPr>
+        <p:spPr>
+          <a:xfrm>
+            <a:off x="9783219" y="3730657"/>
+            <a:ext cx="267788" cy="461665"/>
+          </a:xfrm>
+          <a:prstGeom prst="rect">
+            <a:avLst/>
+          </a:prstGeom>
+          <a:noFill/>
+        </p:spPr>
+        <p:txBody>
+          <a:bodyPr wrap="square" rtlCol="0">
+            <a:spAutoFit/>
+          </a:bodyPr>
+          <a:lstStyle/>
+          <a:p>
+            <a:r>
+              <a:rPr lang="de-DE" sz="2400" b="1" dirty="0">
+                <a:solidFill>
+                  <a:schemeClr val="bg1"/>
+                </a:solidFill>
+              </a:rPr>
+              <a:t>1</a:t>
+            </a:r>
+          </a:p>
+        </p:txBody>
+      </p:sp>
+      <p:sp>
+        <p:nvSpPr>
+          <p:cNvPr id="24" name="Textfeld 23">
+            <a:extLst>
+              <a:ext uri="{FF2B5EF4-FFF2-40B4-BE49-F238E27FC236}">
+                <a16:creationId xmlns:a16="http://schemas.microsoft.com/office/drawing/2014/main" id="{BBF5A806-0075-802A-A774-71F07174DF63}"/>
+              </a:ext>
+            </a:extLst>
+          </p:cNvPr>
+          <p:cNvSpPr txBox="1"/>
+          <p:nvPr/>
+        </p:nvSpPr>
+        <p:spPr>
+          <a:xfrm>
+            <a:off x="7550295" y="3277497"/>
+            <a:ext cx="267788" cy="461665"/>
+          </a:xfrm>
+          <a:prstGeom prst="rect">
+            <a:avLst/>
+          </a:prstGeom>
+          <a:noFill/>
+        </p:spPr>
+        <p:txBody>
+          <a:bodyPr wrap="square" rtlCol="0">
+            <a:spAutoFit/>
+          </a:bodyPr>
+          <a:lstStyle/>
+          <a:p>
+            <a:r>
+              <a:rPr lang="de-DE" sz="2400" b="1" dirty="0">
+                <a:solidFill>
+                  <a:schemeClr val="bg1"/>
+                </a:solidFill>
+              </a:rPr>
+              <a:t>2</a:t>
+            </a:r>
+          </a:p>
+        </p:txBody>
+      </p:sp>
+      <p:sp>
+        <p:nvSpPr>
+          <p:cNvPr id="25" name="Textfeld 24">
+            <a:extLst>
+              <a:ext uri="{FF2B5EF4-FFF2-40B4-BE49-F238E27FC236}">
+                <a16:creationId xmlns:a16="http://schemas.microsoft.com/office/drawing/2014/main" id="{EC0CDF1E-0375-9652-C6E5-5F1F4D211BAA}"/>
+              </a:ext>
+            </a:extLst>
+          </p:cNvPr>
+          <p:cNvSpPr txBox="1"/>
+          <p:nvPr/>
+        </p:nvSpPr>
+        <p:spPr>
+          <a:xfrm>
+            <a:off x="9343870" y="2393451"/>
+            <a:ext cx="267788" cy="461665"/>
+          </a:xfrm>
+          <a:prstGeom prst="rect">
+            <a:avLst/>
+          </a:prstGeom>
+          <a:noFill/>
+        </p:spPr>
+        <p:txBody>
+          <a:bodyPr wrap="square" rtlCol="0">
+            <a:spAutoFit/>
+          </a:bodyPr>
+          <a:lstStyle/>
+          <a:p>
+            <a:r>
+              <a:rPr lang="de-DE" sz="2400" b="1" dirty="0">
+                <a:solidFill>
+                  <a:schemeClr val="bg1"/>
+                </a:solidFill>
+              </a:rPr>
+              <a:t>3</a:t>
+            </a:r>
+          </a:p>
+        </p:txBody>
+      </p:sp>
+      <p:sp>
+        <p:nvSpPr>
+          <p:cNvPr id="26" name="Textfeld 25">
+            <a:extLst>
+              <a:ext uri="{FF2B5EF4-FFF2-40B4-BE49-F238E27FC236}">
+                <a16:creationId xmlns:a16="http://schemas.microsoft.com/office/drawing/2014/main" id="{35A26CE7-888D-7F68-9CA2-0F2912AB45C7}"/>
+              </a:ext>
+            </a:extLst>
+          </p:cNvPr>
+          <p:cNvSpPr txBox="1"/>
+          <p:nvPr/>
+        </p:nvSpPr>
+        <p:spPr>
+          <a:xfrm>
+            <a:off x="9302994" y="1525637"/>
+            <a:ext cx="267788" cy="461665"/>
+          </a:xfrm>
+          <a:prstGeom prst="rect">
+            <a:avLst/>
+          </a:prstGeom>
+          <a:noFill/>
+        </p:spPr>
+        <p:txBody>
+          <a:bodyPr wrap="square" rtlCol="0">
+            <a:spAutoFit/>
+          </a:bodyPr>
+          <a:lstStyle/>
+          <a:p>
+            <a:r>
+              <a:rPr lang="de-DE" sz="2400" b="1" dirty="0">
+                <a:solidFill>
+                  <a:schemeClr val="bg1"/>
+                </a:solidFill>
+              </a:rPr>
+              <a:t>4</a:t>
+            </a:r>
+          </a:p>
+        </p:txBody>
+      </p:sp>
+      <p:sp>
+        <p:nvSpPr>
+          <p:cNvPr id="27" name="Textfeld 26">
+            <a:extLst>
+              <a:ext uri="{FF2B5EF4-FFF2-40B4-BE49-F238E27FC236}">
+                <a16:creationId xmlns:a16="http://schemas.microsoft.com/office/drawing/2014/main" id="{7E057CA6-B0F7-6B4D-58A4-2AF51F7C3D0D}"/>
+              </a:ext>
+            </a:extLst>
+          </p:cNvPr>
+          <p:cNvSpPr txBox="1"/>
+          <p:nvPr/>
+        </p:nvSpPr>
+        <p:spPr>
+          <a:xfrm>
+            <a:off x="6619971" y="1063972"/>
+            <a:ext cx="324338" cy="461665"/>
+          </a:xfrm>
+          <a:prstGeom prst="rect">
+            <a:avLst/>
+          </a:prstGeom>
+          <a:noFill/>
+        </p:spPr>
+        <p:txBody>
+          <a:bodyPr wrap="square" rtlCol="0">
+            <a:spAutoFit/>
+          </a:bodyPr>
+          <a:lstStyle/>
+          <a:p>
+            <a:r>
+              <a:rPr lang="de-DE" sz="2400" b="1" dirty="0">
+                <a:solidFill>
+                  <a:schemeClr val="bg1"/>
+                </a:solidFill>
+              </a:rPr>
+              <a:t>5</a:t>
+            </a:r>
+          </a:p>
+        </p:txBody>
+      </p:sp>
+    </p:spTree>
+    <p:extLst>
+      <p:ext uri="{BB962C8B-B14F-4D97-AF65-F5344CB8AC3E}">
+        <p14:creationId xmlns:p14="http://schemas.microsoft.com/office/powerpoint/2010/main" val="4081623571"/>
+      </p:ext>
+    </p:extLst>
+  </p:cSld>
+  <p:clrMapOvr>
+    <a:masterClrMapping/>
+  </p:clrMapOvr>
+</p:sld>
+</file>
+
+<file path=ppt/slides/slide5.xml><?xml version="1.0" encoding="utf-8"?>
+<p:sld xmlns:a="http://schemas.openxmlformats.org/drawingml/2006/main" xmlns:r="http://schemas.openxmlformats.org/officeDocument/2006/relationships" xmlns:p="http://schemas.openxmlformats.org/presentationml/2006/main">
+  <p:cSld>
+    <p:spTree>
+      <p:nvGrpSpPr>
+        <p:cNvPr id="1" name=""/>
+        <p:cNvGrpSpPr/>
+        <p:nvPr/>
+      </p:nvGrpSpPr>
+      <p:grpSpPr>
+        <a:xfrm>
+          <a:off x="0" y="0"/>
+          <a:ext cx="0" cy="0"/>
+          <a:chOff x="0" y="0"/>
+          <a:chExt cx="0" cy="0"/>
+        </a:xfrm>
+      </p:grpSpPr>
+      <p:pic>
+        <p:nvPicPr>
           <p:cNvPr id="5" name="Inhaltsplatzhalter 4" descr="Ein Bild, das Tisch enthält.&#10;&#10;Automatisch generierte Beschreibung">
             <a:extLst>
               <a:ext uri="{FF2B5EF4-FFF2-40B4-BE49-F238E27FC236}">

</xml_diff>

<commit_message>
storing all ILM data in the db
</commit_message>
<xml_diff>
--- a/ILM_WS202223/Diagramme/Submit_Near/20230227_M5_MA_Teleport-Positionen.pptx
+++ b/ILM_WS202223/Diagramme/Submit_Near/20230227_M5_MA_Teleport-Positionen.pptx
@@ -9,7 +9,8 @@
     <p:sldId id="257" r:id="rId3"/>
     <p:sldId id="258" r:id="rId4"/>
     <p:sldId id="260" r:id="rId5"/>
-    <p:sldId id="259" r:id="rId6"/>
+    <p:sldId id="261" r:id="rId6"/>
+    <p:sldId id="259" r:id="rId7"/>
   </p:sldIdLst>
   <p:sldSz cx="12192000" cy="6858000"/>
   <p:notesSz cx="6858000" cy="9144000"/>
@@ -263,7 +264,7 @@
           <a:p>
             <a:fld id="{D3D81C79-391E-4044-A6C1-2932ABAEBDA0}" type="datetimeFigureOut">
               <a:rPr lang="de-DE" smtClean="0"/>
-              <a:t>16.03.2023</a:t>
+              <a:t>23.03.2023</a:t>
             </a:fld>
             <a:endParaRPr lang="de-DE"/>
           </a:p>
@@ -461,7 +462,7 @@
           <a:p>
             <a:fld id="{D3D81C79-391E-4044-A6C1-2932ABAEBDA0}" type="datetimeFigureOut">
               <a:rPr lang="de-DE" smtClean="0"/>
-              <a:t>16.03.2023</a:t>
+              <a:t>23.03.2023</a:t>
             </a:fld>
             <a:endParaRPr lang="de-DE"/>
           </a:p>
@@ -669,7 +670,7 @@
           <a:p>
             <a:fld id="{D3D81C79-391E-4044-A6C1-2932ABAEBDA0}" type="datetimeFigureOut">
               <a:rPr lang="de-DE" smtClean="0"/>
-              <a:t>16.03.2023</a:t>
+              <a:t>23.03.2023</a:t>
             </a:fld>
             <a:endParaRPr lang="de-DE"/>
           </a:p>
@@ -867,7 +868,7 @@
           <a:p>
             <a:fld id="{D3D81C79-391E-4044-A6C1-2932ABAEBDA0}" type="datetimeFigureOut">
               <a:rPr lang="de-DE" smtClean="0"/>
-              <a:t>16.03.2023</a:t>
+              <a:t>23.03.2023</a:t>
             </a:fld>
             <a:endParaRPr lang="de-DE"/>
           </a:p>
@@ -1142,7 +1143,7 @@
           <a:p>
             <a:fld id="{D3D81C79-391E-4044-A6C1-2932ABAEBDA0}" type="datetimeFigureOut">
               <a:rPr lang="de-DE" smtClean="0"/>
-              <a:t>16.03.2023</a:t>
+              <a:t>23.03.2023</a:t>
             </a:fld>
             <a:endParaRPr lang="de-DE"/>
           </a:p>
@@ -1407,7 +1408,7 @@
           <a:p>
             <a:fld id="{D3D81C79-391E-4044-A6C1-2932ABAEBDA0}" type="datetimeFigureOut">
               <a:rPr lang="de-DE" smtClean="0"/>
-              <a:t>16.03.2023</a:t>
+              <a:t>23.03.2023</a:t>
             </a:fld>
             <a:endParaRPr lang="de-DE"/>
           </a:p>
@@ -1819,7 +1820,7 @@
           <a:p>
             <a:fld id="{D3D81C79-391E-4044-A6C1-2932ABAEBDA0}" type="datetimeFigureOut">
               <a:rPr lang="de-DE" smtClean="0"/>
-              <a:t>16.03.2023</a:t>
+              <a:t>23.03.2023</a:t>
             </a:fld>
             <a:endParaRPr lang="de-DE"/>
           </a:p>
@@ -1960,7 +1961,7 @@
           <a:p>
             <a:fld id="{D3D81C79-391E-4044-A6C1-2932ABAEBDA0}" type="datetimeFigureOut">
               <a:rPr lang="de-DE" smtClean="0"/>
-              <a:t>16.03.2023</a:t>
+              <a:t>23.03.2023</a:t>
             </a:fld>
             <a:endParaRPr lang="de-DE"/>
           </a:p>
@@ -2073,7 +2074,7 @@
           <a:p>
             <a:fld id="{D3D81C79-391E-4044-A6C1-2932ABAEBDA0}" type="datetimeFigureOut">
               <a:rPr lang="de-DE" smtClean="0"/>
-              <a:t>16.03.2023</a:t>
+              <a:t>23.03.2023</a:t>
             </a:fld>
             <a:endParaRPr lang="de-DE"/>
           </a:p>
@@ -2384,7 +2385,7 @@
           <a:p>
             <a:fld id="{D3D81C79-391E-4044-A6C1-2932ABAEBDA0}" type="datetimeFigureOut">
               <a:rPr lang="de-DE" smtClean="0"/>
-              <a:t>16.03.2023</a:t>
+              <a:t>23.03.2023</a:t>
             </a:fld>
             <a:endParaRPr lang="de-DE"/>
           </a:p>
@@ -2672,7 +2673,7 @@
           <a:p>
             <a:fld id="{D3D81C79-391E-4044-A6C1-2932ABAEBDA0}" type="datetimeFigureOut">
               <a:rPr lang="de-DE" smtClean="0"/>
-              <a:t>16.03.2023</a:t>
+              <a:t>23.03.2023</a:t>
             </a:fld>
             <a:endParaRPr lang="de-DE"/>
           </a:p>
@@ -2913,7 +2914,7 @@
           <a:p>
             <a:fld id="{D3D81C79-391E-4044-A6C1-2932ABAEBDA0}" type="datetimeFigureOut">
               <a:rPr lang="de-DE" smtClean="0"/>
-              <a:t>16.03.2023</a:t>
+              <a:t>23.03.2023</a:t>
             </a:fld>
             <a:endParaRPr lang="de-DE"/>
           </a:p>
@@ -4903,6 +4904,106 @@
       </p:grpSpPr>
       <p:pic>
         <p:nvPicPr>
+          <p:cNvPr id="5" name="Inhaltsplatzhalter 4" descr="Ein Bild, das Diagramm enthält.&#10;&#10;Automatisch generierte Beschreibung">
+            <a:extLst>
+              <a:ext uri="{FF2B5EF4-FFF2-40B4-BE49-F238E27FC236}">
+                <a16:creationId xmlns:a16="http://schemas.microsoft.com/office/drawing/2014/main" id="{720CE53A-3508-0AA5-509C-8E31FD39A07E}"/>
+              </a:ext>
+            </a:extLst>
+          </p:cNvPr>
+          <p:cNvPicPr>
+            <a:picLocks noGrp="1" noChangeAspect="1"/>
+          </p:cNvPicPr>
+          <p:nvPr>
+            <p:ph idx="1"/>
+          </p:nvPr>
+        </p:nvPicPr>
+        <p:blipFill>
+          <a:blip r:embed="rId2">
+            <a:extLst>
+              <a:ext uri="{28A0092B-C50C-407E-A947-70E740481C1C}">
+                <a14:useLocalDpi xmlns:a14="http://schemas.microsoft.com/office/drawing/2010/main" val="0"/>
+              </a:ext>
+            </a:extLst>
+          </a:blip>
+          <a:stretch>
+            <a:fillRect/>
+          </a:stretch>
+        </p:blipFill>
+        <p:spPr>
+          <a:xfrm>
+            <a:off x="262212" y="536271"/>
+            <a:ext cx="9332487" cy="5033203"/>
+          </a:xfrm>
+        </p:spPr>
+      </p:pic>
+      <p:pic>
+        <p:nvPicPr>
+          <p:cNvPr id="6" name="Grafik 5" descr="Ein Bild, das Diagramm enthält.&#10;&#10;Automatisch generierte Beschreibung">
+            <a:extLst>
+              <a:ext uri="{FF2B5EF4-FFF2-40B4-BE49-F238E27FC236}">
+                <a16:creationId xmlns:a16="http://schemas.microsoft.com/office/drawing/2014/main" id="{6FA3FC16-7216-9ED6-F354-B5BEE4A27FDB}"/>
+              </a:ext>
+            </a:extLst>
+          </p:cNvPr>
+          <p:cNvPicPr>
+            <a:picLocks noChangeAspect="1"/>
+          </p:cNvPicPr>
+          <p:nvPr/>
+        </p:nvPicPr>
+        <p:blipFill rotWithShape="1">
+          <a:blip r:embed="rId3">
+            <a:extLst>
+              <a:ext uri="{28A0092B-C50C-407E-A947-70E740481C1C}">
+                <a14:useLocalDpi xmlns:a14="http://schemas.microsoft.com/office/drawing/2010/main" val="0"/>
+              </a:ext>
+            </a:extLst>
+          </a:blip>
+          <a:srcRect l="84455" r="6090"/>
+          <a:stretch/>
+        </p:blipFill>
+        <p:spPr>
+          <a:xfrm>
+            <a:off x="9546596" y="48165"/>
+            <a:ext cx="1127182" cy="5914219"/>
+          </a:xfrm>
+          <a:prstGeom prst="rect">
+            <a:avLst/>
+          </a:prstGeom>
+        </p:spPr>
+      </p:pic>
+    </p:spTree>
+    <p:extLst>
+      <p:ext uri="{BB962C8B-B14F-4D97-AF65-F5344CB8AC3E}">
+        <p14:creationId xmlns:p14="http://schemas.microsoft.com/office/powerpoint/2010/main" val="988049909"/>
+      </p:ext>
+    </p:extLst>
+  </p:cSld>
+  <p:clrMapOvr>
+    <a:masterClrMapping/>
+  </p:clrMapOvr>
+</p:sld>
+</file>
+
+<file path=ppt/slides/slide6.xml><?xml version="1.0" encoding="utf-8"?>
+<p:sld xmlns:a="http://schemas.openxmlformats.org/drawingml/2006/main" xmlns:r="http://schemas.openxmlformats.org/officeDocument/2006/relationships" xmlns:p="http://schemas.openxmlformats.org/presentationml/2006/main">
+  <p:cSld>
+    <p:spTree>
+      <p:nvGrpSpPr>
+        <p:cNvPr id="1" name=""/>
+        <p:cNvGrpSpPr/>
+        <p:nvPr/>
+      </p:nvGrpSpPr>
+      <p:grpSpPr>
+        <a:xfrm>
+          <a:off x="0" y="0"/>
+          <a:ext cx="0" cy="0"/>
+          <a:chOff x="0" y="0"/>
+          <a:chExt cx="0" cy="0"/>
+        </a:xfrm>
+      </p:grpSpPr>
+      <p:pic>
+        <p:nvPicPr>
           <p:cNvPr id="5" name="Inhaltsplatzhalter 4" descr="Ein Bild, das Tisch enthält.&#10;&#10;Automatisch generierte Beschreibung">
             <a:extLst>
               <a:ext uri="{FF2B5EF4-FFF2-40B4-BE49-F238E27FC236}">

</xml_diff>